<commit_message>
Alteração de cores na aba "Monitoramentos" do LLD Especifico
</commit_message>
<xml_diff>
--- a/Documentacao/LLD_especifico_KPRunnin.pptx
+++ b/Documentacao/LLD_especifico_KPRunnin.pptx
@@ -2928,7 +2928,13 @@
               <a:rPr lang="pt-BR" dirty="0" smtClean="0">
                 <a:latin typeface="Bahnschrift" panose="020B0502040204020203" pitchFamily="34" charset="0"/>
               </a:rPr>
-              <a:t>API REST - Slack</a:t>
+              <a:t>?API </a:t>
+            </a:r>
+            <a:r>
+              <a:rPr lang="pt-BR" dirty="0" smtClean="0">
+                <a:latin typeface="Bahnschrift" panose="020B0502040204020203" pitchFamily="34" charset="0"/>
+              </a:rPr>
+              <a:t>REST - Slack</a:t>
             </a:r>
             <a:endParaRPr lang="pt-BR" dirty="0">
               <a:latin typeface="Bahnschrift" panose="020B0502040204020203" pitchFamily="34" charset="0"/>
@@ -3072,7 +3078,7 @@
           </a:prstGeom>
           <a:solidFill>
             <a:schemeClr val="bg1">
-              <a:lumMod val="50000"/>
+              <a:lumMod val="65000"/>
             </a:schemeClr>
           </a:solidFill>
           <a:ln>
@@ -3239,7 +3245,7 @@
           </a:prstGeom>
           <a:solidFill>
             <a:schemeClr val="bg1">
-              <a:lumMod val="50000"/>
+              <a:lumMod val="65000"/>
             </a:schemeClr>
           </a:solidFill>
           <a:ln>

</xml_diff>